<commit_message>
DG: update model API
</commit_message>
<xml_diff>
--- a/docs/diagrams/HighLevelSequenceDiagrams.pptx
+++ b/docs/diagrams/HighLevelSequenceDiagrams.pptx
@@ -192,7 +192,7 @@
           <a:p>
             <a:fld id="{F5CC4B3F-88C1-4FFA-B1B6-F41C21DC6924}" type="datetimeFigureOut">
               <a:rPr lang="en-US" smtClean="0"/>
-              <a:t>10/16/2016</a:t>
+              <a:t>06-Jan-17</a:t>
             </a:fld>
             <a:endParaRPr lang="en-US"/>
           </a:p>
@@ -641,7 +641,7 @@
           <a:p>
             <a:fld id="{78C97017-6FC3-485B-9764-EAC9E56C1D49}" type="datetimeFigureOut">
               <a:rPr lang="en-US" smtClean="0"/>
-              <a:t>10/16/2016</a:t>
+              <a:t>06-Jan-17</a:t>
             </a:fld>
             <a:endParaRPr lang="en-US"/>
           </a:p>
@@ -811,7 +811,7 @@
           <a:p>
             <a:fld id="{78C97017-6FC3-485B-9764-EAC9E56C1D49}" type="datetimeFigureOut">
               <a:rPr lang="en-US" smtClean="0"/>
-              <a:t>10/16/2016</a:t>
+              <a:t>06-Jan-17</a:t>
             </a:fld>
             <a:endParaRPr lang="en-US"/>
           </a:p>
@@ -991,7 +991,7 @@
           <a:p>
             <a:fld id="{78C97017-6FC3-485B-9764-EAC9E56C1D49}" type="datetimeFigureOut">
               <a:rPr lang="en-US" smtClean="0"/>
-              <a:t>10/16/2016</a:t>
+              <a:t>06-Jan-17</a:t>
             </a:fld>
             <a:endParaRPr lang="en-US"/>
           </a:p>
@@ -1161,7 +1161,7 @@
           <a:p>
             <a:fld id="{78C97017-6FC3-485B-9764-EAC9E56C1D49}" type="datetimeFigureOut">
               <a:rPr lang="en-US" smtClean="0"/>
-              <a:t>10/16/2016</a:t>
+              <a:t>06-Jan-17</a:t>
             </a:fld>
             <a:endParaRPr lang="en-US"/>
           </a:p>
@@ -1407,7 +1407,7 @@
           <a:p>
             <a:fld id="{78C97017-6FC3-485B-9764-EAC9E56C1D49}" type="datetimeFigureOut">
               <a:rPr lang="en-US" smtClean="0"/>
-              <a:t>10/16/2016</a:t>
+              <a:t>06-Jan-17</a:t>
             </a:fld>
             <a:endParaRPr lang="en-US"/>
           </a:p>
@@ -1695,7 +1695,7 @@
           <a:p>
             <a:fld id="{78C97017-6FC3-485B-9764-EAC9E56C1D49}" type="datetimeFigureOut">
               <a:rPr lang="en-US" smtClean="0"/>
-              <a:t>10/16/2016</a:t>
+              <a:t>06-Jan-17</a:t>
             </a:fld>
             <a:endParaRPr lang="en-US"/>
           </a:p>
@@ -2117,7 +2117,7 @@
           <a:p>
             <a:fld id="{78C97017-6FC3-485B-9764-EAC9E56C1D49}" type="datetimeFigureOut">
               <a:rPr lang="en-US" smtClean="0"/>
-              <a:t>10/16/2016</a:t>
+              <a:t>06-Jan-17</a:t>
             </a:fld>
             <a:endParaRPr lang="en-US"/>
           </a:p>
@@ -2235,7 +2235,7 @@
           <a:p>
             <a:fld id="{78C97017-6FC3-485B-9764-EAC9E56C1D49}" type="datetimeFigureOut">
               <a:rPr lang="en-US" smtClean="0"/>
-              <a:t>10/16/2016</a:t>
+              <a:t>06-Jan-17</a:t>
             </a:fld>
             <a:endParaRPr lang="en-US"/>
           </a:p>
@@ -2330,7 +2330,7 @@
           <a:p>
             <a:fld id="{78C97017-6FC3-485B-9764-EAC9E56C1D49}" type="datetimeFigureOut">
               <a:rPr lang="en-US" smtClean="0"/>
-              <a:t>10/16/2016</a:t>
+              <a:t>06-Jan-17</a:t>
             </a:fld>
             <a:endParaRPr lang="en-US"/>
           </a:p>
@@ -2607,7 +2607,7 @@
           <a:p>
             <a:fld id="{78C97017-6FC3-485B-9764-EAC9E56C1D49}" type="datetimeFigureOut">
               <a:rPr lang="en-US" smtClean="0"/>
-              <a:t>10/16/2016</a:t>
+              <a:t>06-Jan-17</a:t>
             </a:fld>
             <a:endParaRPr lang="en-US"/>
           </a:p>
@@ -2860,7 +2860,7 @@
           <a:p>
             <a:fld id="{78C97017-6FC3-485B-9764-EAC9E56C1D49}" type="datetimeFigureOut">
               <a:rPr lang="en-US" smtClean="0"/>
-              <a:t>10/16/2016</a:t>
+              <a:t>06-Jan-17</a:t>
             </a:fld>
             <a:endParaRPr lang="en-US"/>
           </a:p>
@@ -3073,7 +3073,7 @@
           <a:p>
             <a:fld id="{78C97017-6FC3-485B-9764-EAC9E56C1D49}" type="datetimeFigureOut">
               <a:rPr lang="en-US" smtClean="0"/>
-              <a:t>10/16/2016</a:t>
+              <a:t>06-Jan-17</a:t>
             </a:fld>
             <a:endParaRPr lang="en-US"/>
           </a:p>
@@ -4305,12 +4305,12 @@
           <a:lstStyle/>
           <a:p>
             <a:r>
-              <a:rPr lang="en-US" sz="1400" dirty="0" err="1" smtClean="0">
+              <a:rPr lang="en-US" sz="1400" smtClean="0">
                 <a:solidFill>
                   <a:srgbClr val="7030A0"/>
                 </a:solidFill>
               </a:rPr>
-              <a:t>deletePerson</a:t>
+              <a:t>deletePersons(p</a:t>
             </a:r>
             <a:r>
               <a:rPr lang="en-US" sz="1400" dirty="0" smtClean="0">
@@ -4318,7 +4318,7 @@
                   <a:srgbClr val="7030A0"/>
                 </a:solidFill>
               </a:rPr>
-              <a:t>(p)</a:t>
+              <a:t>)</a:t>
             </a:r>
             <a:endParaRPr lang="en-US" sz="1400" dirty="0">
               <a:solidFill>

</xml_diff>